<commit_message>
Started work on module05 slides and speker notes
</commit_message>
<xml_diff>
--- a/results/m04-slides-and-speaker-notes.pptx
+++ b/results/m04-slides-and-speaker-notes.pptx
@@ -1266,7 +1266,7 @@
             </a:r>
             <a:r>
               <a:rPr/>
-              <a:t>header</a:t>
+              <a:t>header;</a:t>
             </a:r>
           </a:p>
           <a:p>
@@ -11153,47 +11153,135 @@
             </a:r>
             <a:r>
               <a:rPr/>
-              <a:t>15.</a:t>
-            </a:r>
-            <a:r>
-              <a:rPr/>
-              <a:t> </a:t>
-            </a:r>
-            <a:r>
-              <a:rPr/>
-              <a:t>Here</a:t>
-            </a:r>
-            <a:r>
-              <a:rPr/>
-              <a:t> </a:t>
-            </a:r>
-            <a:r>
-              <a:rPr/>
-              <a:t>is</a:t>
-            </a:r>
-            <a:r>
-              <a:rPr/>
-              <a:t> </a:t>
-            </a:r>
-            <a:r>
-              <a:rPr/>
-              <a:t>a</a:t>
-            </a:r>
-            <a:r>
-              <a:rPr/>
-              <a:t> </a:t>
-            </a:r>
-            <a:r>
-              <a:rPr/>
-              <a:t>quality</a:t>
-            </a:r>
-            <a:r>
-              <a:rPr/>
-              <a:t> </a:t>
-            </a:r>
-            <a:r>
-              <a:rPr/>
-              <a:t>check.</a:t>
+              <a:t>16.</a:t>
+            </a:r>
+            <a:r>
+              <a:rPr/>
+              <a:t> </a:t>
+            </a:r>
+            <a:r>
+              <a:rPr/>
+              <a:t>Notice</a:t>
+            </a:r>
+            <a:r>
+              <a:rPr/>
+              <a:t> </a:t>
+            </a:r>
+            <a:r>
+              <a:rPr/>
+              <a:t>that</a:t>
+            </a:r>
+            <a:r>
+              <a:rPr/>
+              <a:t> </a:t>
+            </a:r>
+            <a:r>
+              <a:rPr/>
+              <a:t>SAS</a:t>
+            </a:r>
+            <a:r>
+              <a:rPr/>
+              <a:t> </a:t>
+            </a:r>
+            <a:r>
+              <a:rPr/>
+              <a:t>provides</a:t>
+            </a:r>
+            <a:r>
+              <a:rPr/>
+              <a:t> </a:t>
+            </a:r>
+            <a:r>
+              <a:rPr/>
+              <a:t>three</a:t>
+            </a:r>
+            <a:r>
+              <a:rPr/>
+              <a:t> </a:t>
+            </a:r>
+            <a:r>
+              <a:rPr/>
+              <a:t>different</a:t>
+            </a:r>
+            <a:r>
+              <a:rPr/>
+              <a:t> </a:t>
+            </a:r>
+            <a:r>
+              <a:rPr/>
+              <a:t>percentages.</a:t>
+            </a:r>
+            <a:r>
+              <a:rPr/>
+              <a:t> </a:t>
+            </a:r>
+            <a:r>
+              <a:rPr/>
+              <a:t>I</a:t>
+            </a:r>
+            <a:r>
+              <a:rPr/>
+              <a:t> </a:t>
+            </a:r>
+            <a:r>
+              <a:rPr/>
+              <a:t>do</a:t>
+            </a:r>
+            <a:r>
+              <a:rPr/>
+              <a:t> </a:t>
+            </a:r>
+            <a:r>
+              <a:rPr/>
+              <a:t>NOT</a:t>
+            </a:r>
+            <a:r>
+              <a:rPr/>
+              <a:t> </a:t>
+            </a:r>
+            <a:r>
+              <a:rPr/>
+              <a:t>recommend</a:t>
+            </a:r>
+            <a:r>
+              <a:rPr/>
+              <a:t> </a:t>
+            </a:r>
+            <a:r>
+              <a:rPr/>
+              <a:t>that</a:t>
+            </a:r>
+            <a:r>
+              <a:rPr/>
+              <a:t> </a:t>
+            </a:r>
+            <a:r>
+              <a:rPr/>
+              <a:t>you</a:t>
+            </a:r>
+            <a:r>
+              <a:rPr/>
+              <a:t> </a:t>
+            </a:r>
+            <a:r>
+              <a:rPr/>
+              <a:t>show</a:t>
+            </a:r>
+            <a:r>
+              <a:rPr/>
+              <a:t> </a:t>
+            </a:r>
+            <a:r>
+              <a:rPr/>
+              <a:t>every</a:t>
+            </a:r>
+            <a:r>
+              <a:rPr/>
+              <a:t> </a:t>
+            </a:r>
+            <a:r>
+              <a:rPr/>
+              <a:t>percentage.</a:t>
             </a:r>
           </a:p>
         </p:txBody>
@@ -21738,12 +21826,14 @@
               <a:rPr sz="1800">
                 <a:latin typeface="Courier"/>
               </a:rPr>
-              <a:t>m04-5507-simon-categorical-variables
+              <a:t>*************************************************
+m04-5507-simon-categorical-variables
 author: Steve Simon
 Date created: 2018-10-22
 Purpose: To illustrate how to work with datasets
-with mostly continuous variables.
-License: public domain;</a:t>
+with mostly categorical variables.
+License: public domain;
+*************************************************;</a:t>
             </a:r>
           </a:p>
         </p:txBody>
@@ -22861,7 +22951,7 @@
   set perm.titanic;
   if PClass = "1st"
     then first_class = "Yes";
-    else first_class = "No";
+    else first_class = "No ";
 run;
 proc freq
     data=first_class;

</xml_diff>